<commit_message>
Update notebook and presentation
</commit_message>
<xml_diff>
--- a/Parasite Eggs Identification.pptx
+++ b/Parasite Eggs Identification.pptx
@@ -879,7 +879,7 @@
             <a:fld id="{B61BEF0D-F0BB-DE4B-95CE-6DB70DBA9567}" type="datetimeFigureOut">
               <a:rPr lang="en-US" dirty="0"/>
               <a:pPr/>
-              <a:t>12/17/2020</a:t>
+              <a:t>12/18/2020</a:t>
             </a:fld>
             <a:endParaRPr lang="en-US" dirty="0"/>
           </a:p>
@@ -1127,7 +1127,7 @@
             <a:fld id="{B61BEF0D-F0BB-DE4B-95CE-6DB70DBA9567}" type="datetimeFigureOut">
               <a:rPr lang="en-US" dirty="0"/>
               <a:pPr/>
-              <a:t>12/17/2020</a:t>
+              <a:t>12/18/2020</a:t>
             </a:fld>
             <a:endParaRPr lang="en-US" dirty="0"/>
           </a:p>
@@ -1438,7 +1438,7 @@
             <a:fld id="{B61BEF0D-F0BB-DE4B-95CE-6DB70DBA9567}" type="datetimeFigureOut">
               <a:rPr lang="en-US" dirty="0"/>
               <a:pPr/>
-              <a:t>12/17/2020</a:t>
+              <a:t>12/18/2020</a:t>
             </a:fld>
             <a:endParaRPr lang="en-US" dirty="0"/>
           </a:p>
@@ -1768,7 +1768,7 @@
             <a:fld id="{B61BEF0D-F0BB-DE4B-95CE-6DB70DBA9567}" type="datetimeFigureOut">
               <a:rPr lang="en-US" dirty="0"/>
               <a:pPr/>
-              <a:t>12/17/2020</a:t>
+              <a:t>12/18/2020</a:t>
             </a:fld>
             <a:endParaRPr lang="en-US" dirty="0"/>
           </a:p>
@@ -2079,7 +2079,7 @@
             <a:fld id="{B61BEF0D-F0BB-DE4B-95CE-6DB70DBA9567}" type="datetimeFigureOut">
               <a:rPr lang="en-US" dirty="0"/>
               <a:pPr/>
-              <a:t>12/17/2020</a:t>
+              <a:t>12/18/2020</a:t>
             </a:fld>
             <a:endParaRPr lang="en-US" dirty="0"/>
           </a:p>
@@ -2469,7 +2469,7 @@
             <a:fld id="{B61BEF0D-F0BB-DE4B-95CE-6DB70DBA9567}" type="datetimeFigureOut">
               <a:rPr lang="en-US" dirty="0"/>
               <a:pPr/>
-              <a:t>12/17/2020</a:t>
+              <a:t>12/18/2020</a:t>
             </a:fld>
             <a:endParaRPr lang="en-US" dirty="0"/>
           </a:p>
@@ -2635,7 +2635,7 @@
           <a:p>
             <a:fld id="{55C6B4A9-1611-4792-9094-5F34BCA07E0B}" type="datetimeFigureOut">
               <a:rPr lang="en-US" dirty="0"/>
-              <a:t>12/17/2020</a:t>
+              <a:t>12/18/2020</a:t>
             </a:fld>
             <a:endParaRPr lang="en-US" dirty="0"/>
           </a:p>
@@ -2811,7 +2811,7 @@
             <a:fld id="{B61BEF0D-F0BB-DE4B-95CE-6DB70DBA9567}" type="datetimeFigureOut">
               <a:rPr lang="en-US" dirty="0"/>
               <a:pPr/>
-              <a:t>12/17/2020</a:t>
+              <a:t>12/18/2020</a:t>
             </a:fld>
             <a:endParaRPr lang="en-US" dirty="0"/>
           </a:p>
@@ -2977,7 +2977,7 @@
           <a:p>
             <a:fld id="{42A54C80-263E-416B-A8E0-580EDEADCBDC}" type="datetimeFigureOut">
               <a:rPr lang="en-US" dirty="0"/>
-              <a:t>12/17/2020</a:t>
+              <a:t>12/18/2020</a:t>
             </a:fld>
             <a:endParaRPr lang="en-US" dirty="0"/>
           </a:p>
@@ -3220,7 +3220,7 @@
             <a:fld id="{B61BEF0D-F0BB-DE4B-95CE-6DB70DBA9567}" type="datetimeFigureOut">
               <a:rPr lang="en-US" dirty="0"/>
               <a:pPr/>
-              <a:t>12/17/2020</a:t>
+              <a:t>12/18/2020</a:t>
             </a:fld>
             <a:endParaRPr lang="en-US" dirty="0"/>
           </a:p>
@@ -3448,7 +3448,7 @@
           <a:p>
             <a:fld id="{42A54C80-263E-416B-A8E0-580EDEADCBDC}" type="datetimeFigureOut">
               <a:rPr lang="en-US" dirty="0"/>
-              <a:t>12/17/2020</a:t>
+              <a:t>12/18/2020</a:t>
             </a:fld>
             <a:endParaRPr lang="en-US" dirty="0"/>
           </a:p>
@@ -3818,7 +3818,7 @@
             <a:fld id="{B61BEF0D-F0BB-DE4B-95CE-6DB70DBA9567}" type="datetimeFigureOut">
               <a:rPr lang="en-US" dirty="0"/>
               <a:pPr/>
-              <a:t>12/17/2020</a:t>
+              <a:t>12/18/2020</a:t>
             </a:fld>
             <a:endParaRPr lang="en-US" dirty="0"/>
           </a:p>
@@ -3938,7 +3938,7 @@
             <a:fld id="{B61BEF0D-F0BB-DE4B-95CE-6DB70DBA9567}" type="datetimeFigureOut">
               <a:rPr lang="en-US" dirty="0"/>
               <a:pPr/>
-              <a:t>12/17/2020</a:t>
+              <a:t>12/18/2020</a:t>
             </a:fld>
             <a:endParaRPr lang="en-US" dirty="0"/>
           </a:p>
@@ -4030,7 +4030,7 @@
             <a:fld id="{B61BEF0D-F0BB-DE4B-95CE-6DB70DBA9567}" type="datetimeFigureOut">
               <a:rPr lang="en-US" dirty="0"/>
               <a:pPr/>
-              <a:t>12/17/2020</a:t>
+              <a:t>12/18/2020</a:t>
             </a:fld>
             <a:endParaRPr lang="en-US" dirty="0"/>
           </a:p>
@@ -4281,7 +4281,7 @@
           <a:p>
             <a:fld id="{42A54C80-263E-416B-A8E0-580EDEADCBDC}" type="datetimeFigureOut">
               <a:rPr lang="en-US" dirty="0"/>
-              <a:t>12/17/2020</a:t>
+              <a:t>12/18/2020</a:t>
             </a:fld>
             <a:endParaRPr lang="en-US" dirty="0"/>
           </a:p>
@@ -4583,7 +4583,7 @@
             <a:fld id="{B61BEF0D-F0BB-DE4B-95CE-6DB70DBA9567}" type="datetimeFigureOut">
               <a:rPr lang="en-US" dirty="0"/>
               <a:pPr/>
-              <a:t>12/17/2020</a:t>
+              <a:t>12/18/2020</a:t>
             </a:fld>
             <a:endParaRPr lang="en-US" dirty="0"/>
           </a:p>
@@ -5281,7 +5281,7 @@
             <a:fld id="{B61BEF0D-F0BB-DE4B-95CE-6DB70DBA9567}" type="datetimeFigureOut">
               <a:rPr lang="en-US" dirty="0"/>
               <a:pPr/>
-              <a:t>12/17/2020</a:t>
+              <a:t>12/18/2020</a:t>
             </a:fld>
             <a:endParaRPr lang="en-US" dirty="0"/>
           </a:p>
@@ -12311,7 +12311,7 @@
           <p:nvPr>
             <p:extLst>
               <p:ext uri="{D42A27DB-BD31-4B8C-83A1-F6EECF244321}">
-                <p14:modId xmlns:p14="http://schemas.microsoft.com/office/powerpoint/2010/main" val="990229978"/>
+                <p14:modId xmlns:p14="http://schemas.microsoft.com/office/powerpoint/2010/main" val="1154354975"/>
               </p:ext>
             </p:extLst>
           </p:nvPr>
@@ -12463,7 +12463,7 @@
                     <a:p>
                       <a:r>
                         <a:rPr lang="en-AU" sz="1400" noProof="0" dirty="0"/>
-                        <a:t>0.80</a:t>
+                        <a:t>0.79139</a:t>
                       </a:r>
                     </a:p>
                   </a:txBody>
@@ -12522,7 +12522,7 @@
                     <a:p>
                       <a:r>
                         <a:rPr lang="en-AU" sz="1400" noProof="0" dirty="0"/>
-                        <a:t>0.96</a:t>
+                        <a:t>0.95364</a:t>
                       </a:r>
                     </a:p>
                   </a:txBody>
@@ -12535,7 +12535,7 @@
                     <a:p>
                       <a:r>
                         <a:rPr lang="en-AU" sz="1400" noProof="0" dirty="0"/>
-                        <a:t>0.98</a:t>
+                        <a:t>0.98058</a:t>
                       </a:r>
                     </a:p>
                   </a:txBody>
@@ -12548,7 +12548,7 @@
                     <a:p>
                       <a:r>
                         <a:rPr lang="en-AU" sz="1400" noProof="0" dirty="0"/>
-                        <a:t>?</a:t>
+                        <a:t>0.95748</a:t>
                       </a:r>
                     </a:p>
                   </a:txBody>
@@ -12567,8 +12567,22 @@
                     <a:lstStyle/>
                     <a:p>
                       <a:r>
-                        <a:rPr lang="en-AU" sz="1400" noProof="0"/>
+                        <a:rPr lang="en-AU" sz="1400" noProof="0" dirty="0" err="1"/>
                         <a:t>GoogLeNet</a:t>
+                      </a:r>
+                      <a:endParaRPr lang="en-AU" sz="1400" noProof="0" dirty="0"/>
+                    </a:p>
+                  </a:txBody>
+                  <a:tcPr/>
+                </a:tc>
+                <a:tc>
+                  <a:txBody>
+                    <a:bodyPr/>
+                    <a:lstStyle/>
+                    <a:p>
+                      <a:r>
+                        <a:rPr lang="en-AU" sz="1400" noProof="0" dirty="0"/>
+                        <a:t>0.97019</a:t>
                       </a:r>
                     </a:p>
                   </a:txBody>
@@ -12581,7 +12595,7 @@
                     <a:p>
                       <a:r>
                         <a:rPr lang="en-AU" sz="1400" noProof="0" dirty="0"/>
-                        <a:t>0.95</a:t>
+                        <a:t>0.98058</a:t>
                       </a:r>
                     </a:p>
                   </a:txBody>
@@ -12594,20 +12608,7 @@
                     <a:p>
                       <a:r>
                         <a:rPr lang="en-AU" sz="1400" noProof="0" dirty="0"/>
-                        <a:t>0.98</a:t>
-                      </a:r>
-                    </a:p>
-                  </a:txBody>
-                  <a:tcPr/>
-                </a:tc>
-                <a:tc>
-                  <a:txBody>
-                    <a:bodyPr/>
-                    <a:lstStyle/>
-                    <a:p>
-                      <a:r>
-                        <a:rPr lang="en-AU" sz="1400" noProof="0" dirty="0"/>
-                        <a:t>?</a:t>
+                        <a:t>0.98897</a:t>
                       </a:r>
                     </a:p>
                   </a:txBody>
@@ -12637,8 +12638,8 @@
         </p:nvSpPr>
         <p:spPr>
           <a:xfrm>
-            <a:off x="3051810" y="4724204"/>
-            <a:ext cx="496570" cy="236394"/>
+            <a:off x="3056890" y="5038398"/>
+            <a:ext cx="773430" cy="236394"/>
           </a:xfrm>
           <a:prstGeom prst="ellipse">
             <a:avLst/>
@@ -12712,7 +12713,23 @@
                   <a:schemeClr val="accent1"/>
                 </a:solidFill>
               </a:rPr>
-              <a:t>Select VGG11_bn as final model</a:t>
+              <a:t>Select </a:t>
+            </a:r>
+            <a:r>
+              <a:rPr lang="en-AU" sz="1600" dirty="0" err="1">
+                <a:solidFill>
+                  <a:schemeClr val="accent1"/>
+                </a:solidFill>
+              </a:rPr>
+              <a:t>GoogLeNet</a:t>
+            </a:r>
+            <a:r>
+              <a:rPr lang="en-AU" sz="1600" dirty="0">
+                <a:solidFill>
+                  <a:schemeClr val="accent1"/>
+                </a:solidFill>
+              </a:rPr>
+              <a:t> as final model</a:t>
             </a:r>
           </a:p>
         </p:txBody>
@@ -15227,7 +15244,7 @@
         <p:spPr>
           <a:xfrm>
             <a:off x="3161686" y="3211159"/>
-            <a:ext cx="3620114" cy="2238874"/>
+            <a:ext cx="3620114" cy="2238873"/>
           </a:xfrm>
           <a:prstGeom prst="rect">
             <a:avLst/>

</xml_diff>